<commit_message>
programming basics example codes
</commit_message>
<xml_diff>
--- a/Programming Basics/Presentation/Data types and Operators.pptx
+++ b/Programming Basics/Presentation/Data types and Operators.pptx
@@ -5034,22 +5034,6 @@
               <a:t>!          		=&gt; Logical negation (not)</a:t>
             </a:r>
           </a:p>
-          <a:p>
-            <a:pPr lvl="1"/>
-            <a:r>
-              <a:rPr lang="en-US" dirty="0"/>
-              <a:t>~         		=&gt; Bitwise complement (invert every bit)</a:t>
-            </a:r>
-          </a:p>
-          <a:p>
-            <a:pPr>
-              <a:buFont typeface="Courier New" panose="02070309020205020404" pitchFamily="49" charset="0"/>
-              <a:buChar char="o"/>
-            </a:pPr>
-            <a:endParaRPr lang="en-US" dirty="0">
-              <a:latin typeface="Calibri" panose="020F0502020204030204" pitchFamily="34" charset="0"/>
-            </a:endParaRPr>
-          </a:p>
         </p:txBody>
       </p:sp>
       <p:sp>
@@ -6212,7 +6196,7 @@
           <a:lstStyle/>
           <a:p>
             <a:r>
-              <a:rPr lang="en-US" altLang="en-US">
+              <a:rPr lang="en-US" altLang="en-US" dirty="0">
                 <a:latin typeface="Calibri" panose="020F0502020204030204" pitchFamily="34" charset="0"/>
               </a:rPr>
               <a:t>Order of precedence</a:t>

</xml_diff>